<commit_message>
updated name in ppt
</commit_message>
<xml_diff>
--- a/The Hunt.pptx
+++ b/The Hunt.pptx
@@ -348,7 +348,7 @@
           <a:p>
             <a:fld id="{48A87A34-81AB-432B-8DAE-1953F412C126}" type="datetimeFigureOut">
               <a:rPr lang="en-US" smtClean="0"/>
-              <a:t>4/20/2021</a:t>
+              <a:t>4/22/2021</a:t>
             </a:fld>
             <a:endParaRPr lang="en-US" dirty="0"/>
           </a:p>
@@ -556,7 +556,7 @@
           <a:p>
             <a:fld id="{48A87A34-81AB-432B-8DAE-1953F412C126}" type="datetimeFigureOut">
               <a:rPr lang="en-US" smtClean="0"/>
-              <a:t>4/20/2021</a:t>
+              <a:t>4/22/2021</a:t>
             </a:fld>
             <a:endParaRPr lang="en-US" dirty="0"/>
           </a:p>
@@ -812,7 +812,7 @@
           <a:p>
             <a:fld id="{48A87A34-81AB-432B-8DAE-1953F412C126}" type="datetimeFigureOut">
               <a:rPr lang="en-US" smtClean="0"/>
-              <a:t>4/20/2021</a:t>
+              <a:t>4/22/2021</a:t>
             </a:fld>
             <a:endParaRPr lang="en-US" dirty="0"/>
           </a:p>
@@ -986,7 +986,7 @@
           <a:p>
             <a:fld id="{48A87A34-81AB-432B-8DAE-1953F412C126}" type="datetimeFigureOut">
               <a:rPr lang="en-US" smtClean="0"/>
-              <a:t>4/20/2021</a:t>
+              <a:t>4/22/2021</a:t>
             </a:fld>
             <a:endParaRPr lang="en-US" dirty="0"/>
           </a:p>
@@ -1329,7 +1329,7 @@
           <a:p>
             <a:fld id="{48A87A34-81AB-432B-8DAE-1953F412C126}" type="datetimeFigureOut">
               <a:rPr lang="en-US" smtClean="0"/>
-              <a:t>4/20/2021</a:t>
+              <a:t>4/22/2021</a:t>
             </a:fld>
             <a:endParaRPr lang="en-US" dirty="0"/>
           </a:p>
@@ -1604,7 +1604,7 @@
           <a:p>
             <a:fld id="{48A87A34-81AB-432B-8DAE-1953F412C126}" type="datetimeFigureOut">
               <a:rPr lang="en-US" smtClean="0"/>
-              <a:t>4/20/2021</a:t>
+              <a:t>4/22/2021</a:t>
             </a:fld>
             <a:endParaRPr lang="en-US" dirty="0"/>
           </a:p>
@@ -1983,7 +1983,7 @@
           <a:p>
             <a:fld id="{48A87A34-81AB-432B-8DAE-1953F412C126}" type="datetimeFigureOut">
               <a:rPr lang="en-US" smtClean="0"/>
-              <a:t>4/20/2021</a:t>
+              <a:t>4/22/2021</a:t>
             </a:fld>
             <a:endParaRPr lang="en-US" dirty="0"/>
           </a:p>
@@ -2101,7 +2101,7 @@
           <a:p>
             <a:fld id="{48A87A34-81AB-432B-8DAE-1953F412C126}" type="datetimeFigureOut">
               <a:rPr lang="en-US" smtClean="0"/>
-              <a:t>4/20/2021</a:t>
+              <a:t>4/22/2021</a:t>
             </a:fld>
             <a:endParaRPr lang="en-US" dirty="0"/>
           </a:p>
@@ -2272,7 +2272,7 @@
           <a:p>
             <a:fld id="{48A87A34-81AB-432B-8DAE-1953F412C126}" type="datetimeFigureOut">
               <a:rPr lang="en-US" smtClean="0"/>
-              <a:t>4/20/2021</a:t>
+              <a:t>4/22/2021</a:t>
             </a:fld>
             <a:endParaRPr lang="en-US" dirty="0"/>
           </a:p>
@@ -2626,7 +2626,7 @@
           <a:p>
             <a:fld id="{48A87A34-81AB-432B-8DAE-1953F412C126}" type="datetimeFigureOut">
               <a:rPr lang="en-US" smtClean="0"/>
-              <a:t>4/20/2021</a:t>
+              <a:t>4/22/2021</a:t>
             </a:fld>
             <a:endParaRPr lang="en-US" dirty="0"/>
           </a:p>
@@ -3008,7 +3008,7 @@
           <a:p>
             <a:fld id="{48A87A34-81AB-432B-8DAE-1953F412C126}" type="datetimeFigureOut">
               <a:rPr lang="en-US" smtClean="0"/>
-              <a:t>4/20/2021</a:t>
+              <a:t>4/22/2021</a:t>
             </a:fld>
             <a:endParaRPr lang="en-US" dirty="0"/>
           </a:p>
@@ -3296,7 +3296,7 @@
             <a:fld id="{48A87A34-81AB-432B-8DAE-1953F412C126}" type="datetimeFigureOut">
               <a:rPr lang="en-US" smtClean="0"/>
               <a:pPr/>
-              <a:t>4/20/2021</a:t>
+              <a:t>4/22/2021</a:t>
             </a:fld>
             <a:endParaRPr lang="en-US" dirty="0"/>
           </a:p>
@@ -4184,8 +4184,8 @@
         </p:nvSpPr>
         <p:spPr>
           <a:xfrm>
-            <a:off x="1638846" y="5697975"/>
-            <a:ext cx="8579212" cy="461665"/>
+            <a:off x="313509" y="5697975"/>
+            <a:ext cx="11769634" cy="461665"/>
           </a:xfrm>
           <a:prstGeom prst="rect">
             <a:avLst/>
@@ -4199,7 +4199,15 @@
           <a:p>
             <a:r>
               <a:rPr lang="en-US" sz="2400" b="1" dirty="0" smtClean="0"/>
-              <a:t>Yeshwanth Damera</a:t>
+              <a:t>                   Venkatay</a:t>
+            </a:r>
+            <a:r>
+              <a:rPr lang="en-US" sz="2400" b="1" dirty="0" smtClean="0"/>
+              <a:t>ashwanth </a:t>
+            </a:r>
+            <a:r>
+              <a:rPr lang="en-US" sz="2400" b="1" dirty="0" smtClean="0"/>
+              <a:t>Damera</a:t>
             </a:r>
             <a:r>
               <a:rPr lang="en-US" sz="2400" b="1" dirty="0"/>
@@ -4207,7 +4215,23 @@
             </a:r>
             <a:r>
               <a:rPr lang="en-US" sz="2400" b="1" dirty="0" smtClean="0"/>
-              <a:t>				Pruthvi </a:t>
+              <a:t>		</a:t>
+            </a:r>
+            <a:r>
+              <a:rPr lang="en-US" sz="2400" b="1" dirty="0"/>
+              <a:t> </a:t>
+            </a:r>
+            <a:r>
+              <a:rPr lang="en-US" sz="2400" b="1" dirty="0" smtClean="0"/>
+              <a:t>  </a:t>
+            </a:r>
+            <a:r>
+              <a:rPr lang="en-US" sz="2400" b="1" dirty="0" err="1" smtClean="0"/>
+              <a:t>Pruthvi</a:t>
+            </a:r>
+            <a:r>
+              <a:rPr lang="en-US" sz="2400" b="1" dirty="0" smtClean="0"/>
+              <a:t> </a:t>
             </a:r>
             <a:r>
               <a:rPr lang="en-US" sz="2400" b="1" dirty="0"/>
@@ -4439,11 +4463,7 @@
             </a:pPr>
             <a:r>
               <a:rPr lang="en-US" sz="2800" dirty="0" smtClean="0"/>
-              <a:t> </a:t>
-            </a:r>
-            <a:r>
-              <a:rPr lang="en-US" sz="2800" dirty="0" smtClean="0"/>
-              <a:t>Platform </a:t>
+              <a:t> Platform </a:t>
             </a:r>
             <a:r>
               <a:rPr lang="en-US" sz="2800" dirty="0"/>

</xml_diff>